<commit_message>
new files versions updated
</commit_message>
<xml_diff>
--- a/Resumes 101.pptx
+++ b/Resumes 101.pptx
@@ -26,11 +26,12 @@
     <p:sldId id="275" r:id="rId20"/>
     <p:sldId id="270" r:id="rId21"/>
     <p:sldId id="271" r:id="rId22"/>
-    <p:sldId id="276" r:id="rId23"/>
-    <p:sldId id="272" r:id="rId24"/>
-    <p:sldId id="277" r:id="rId25"/>
-    <p:sldId id="278" r:id="rId26"/>
-    <p:sldId id="274" r:id="rId27"/>
+    <p:sldId id="284" r:id="rId23"/>
+    <p:sldId id="276" r:id="rId24"/>
+    <p:sldId id="272" r:id="rId25"/>
+    <p:sldId id="277" r:id="rId26"/>
+    <p:sldId id="278" r:id="rId27"/>
+    <p:sldId id="274" r:id="rId28"/>
   </p:sldIdLst>
   <p:sldSz cx="12192000" cy="6858000"/>
   <p:notesSz cx="6858000" cy="9144000"/>
@@ -135,6 +136,315 @@
     </p:ext>
   </p:extLst>
 </p:presentation>
+</file>
+
+<file path=ppt/revisionInfo.xml><?xml version="1.0" encoding="utf-8"?>
+<p1510:revInfo xmlns:a="http://schemas.openxmlformats.org/drawingml/2006/main" xmlns:r="http://schemas.openxmlformats.org/officeDocument/2006/relationships" xmlns:p1510="http://schemas.microsoft.com/office/powerpoint/2015/10/main">
+  <p1510:revLst>
+    <p1510:client id="{99D4D380-6BE3-4538-8C7C-DBE8CC44D844}" v="6" dt="2023-11-14T15:36:19.167"/>
+  </p1510:revLst>
+</p1510:revInfo>
+</file>
+
+<file path=ppt/changesInfos/changesInfo1.xml><?xml version="1.0" encoding="utf-8"?>
+<pc:chgInfo xmlns:a="http://schemas.openxmlformats.org/drawingml/2006/main" xmlns:r="http://schemas.openxmlformats.org/officeDocument/2006/relationships" xmlns:ac="http://schemas.microsoft.com/office/drawing/2013/main/command" xmlns:pc="http://schemas.microsoft.com/office/powerpoint/2013/main/command">
+  <pc:docChgLst>
+    <pc:chgData name="Prakit Mohal" userId="ad5a436fb529fd67" providerId="LiveId" clId="{99D4D380-6BE3-4538-8C7C-DBE8CC44D844}"/>
+    <pc:docChg chg="custSel addSld modSld">
+      <pc:chgData name="Prakit Mohal" userId="ad5a436fb529fd67" providerId="LiveId" clId="{99D4D380-6BE3-4538-8C7C-DBE8CC44D844}" dt="2023-11-14T15:38:12.025" v="615" actId="20577"/>
+      <pc:docMkLst>
+        <pc:docMk/>
+      </pc:docMkLst>
+      <pc:sldChg chg="modSp mod">
+        <pc:chgData name="Prakit Mohal" userId="ad5a436fb529fd67" providerId="LiveId" clId="{99D4D380-6BE3-4538-8C7C-DBE8CC44D844}" dt="2023-11-14T15:11:33.994" v="3" actId="20577"/>
+        <pc:sldMkLst>
+          <pc:docMk/>
+          <pc:sldMk cId="1789316110" sldId="256"/>
+        </pc:sldMkLst>
+        <pc:spChg chg="mod">
+          <ac:chgData name="Prakit Mohal" userId="ad5a436fb529fd67" providerId="LiveId" clId="{99D4D380-6BE3-4538-8C7C-DBE8CC44D844}" dt="2023-11-14T15:11:33.994" v="3" actId="20577"/>
+          <ac:spMkLst>
+            <pc:docMk/>
+            <pc:sldMk cId="1789316110" sldId="256"/>
+            <ac:spMk id="3" creationId="{39ABE91E-28D1-BE41-7AC2-0F78A391FE2E}"/>
+          </ac:spMkLst>
+        </pc:spChg>
+      </pc:sldChg>
+      <pc:sldChg chg="modSp mod">
+        <pc:chgData name="Prakit Mohal" userId="ad5a436fb529fd67" providerId="LiveId" clId="{99D4D380-6BE3-4538-8C7C-DBE8CC44D844}" dt="2023-11-14T15:12:02.110" v="32" actId="20577"/>
+        <pc:sldMkLst>
+          <pc:docMk/>
+          <pc:sldMk cId="882607904" sldId="258"/>
+        </pc:sldMkLst>
+        <pc:spChg chg="mod">
+          <ac:chgData name="Prakit Mohal" userId="ad5a436fb529fd67" providerId="LiveId" clId="{99D4D380-6BE3-4538-8C7C-DBE8CC44D844}" dt="2023-11-14T15:12:02.110" v="32" actId="20577"/>
+          <ac:spMkLst>
+            <pc:docMk/>
+            <pc:sldMk cId="882607904" sldId="258"/>
+            <ac:spMk id="3" creationId="{65E3D498-7525-6150-E558-C15CA219677A}"/>
+          </ac:spMkLst>
+        </pc:spChg>
+      </pc:sldChg>
+      <pc:sldChg chg="modSp mod">
+        <pc:chgData name="Prakit Mohal" userId="ad5a436fb529fd67" providerId="LiveId" clId="{99D4D380-6BE3-4538-8C7C-DBE8CC44D844}" dt="2023-11-14T15:12:45.335" v="36" actId="33524"/>
+        <pc:sldMkLst>
+          <pc:docMk/>
+          <pc:sldMk cId="3168676743" sldId="262"/>
+        </pc:sldMkLst>
+        <pc:spChg chg="mod">
+          <ac:chgData name="Prakit Mohal" userId="ad5a436fb529fd67" providerId="LiveId" clId="{99D4D380-6BE3-4538-8C7C-DBE8CC44D844}" dt="2023-11-14T15:12:45.335" v="36" actId="33524"/>
+          <ac:spMkLst>
+            <pc:docMk/>
+            <pc:sldMk cId="3168676743" sldId="262"/>
+            <ac:spMk id="3" creationId="{D704A39F-7092-071C-91DA-70D1ACCF782E}"/>
+          </ac:spMkLst>
+        </pc:spChg>
+      </pc:sldChg>
+      <pc:sldChg chg="modSp mod">
+        <pc:chgData name="Prakit Mohal" userId="ad5a436fb529fd67" providerId="LiveId" clId="{99D4D380-6BE3-4538-8C7C-DBE8CC44D844}" dt="2023-11-14T15:12:19.444" v="34" actId="33524"/>
+        <pc:sldMkLst>
+          <pc:docMk/>
+          <pc:sldMk cId="4088508952" sldId="263"/>
+        </pc:sldMkLst>
+        <pc:spChg chg="mod">
+          <ac:chgData name="Prakit Mohal" userId="ad5a436fb529fd67" providerId="LiveId" clId="{99D4D380-6BE3-4538-8C7C-DBE8CC44D844}" dt="2023-11-14T15:12:19.444" v="34" actId="33524"/>
+          <ac:spMkLst>
+            <pc:docMk/>
+            <pc:sldMk cId="4088508952" sldId="263"/>
+            <ac:spMk id="3" creationId="{2A146A77-96C0-3CF0-7508-03345A2CC082}"/>
+          </ac:spMkLst>
+        </pc:spChg>
+      </pc:sldChg>
+      <pc:sldChg chg="modSp mod">
+        <pc:chgData name="Prakit Mohal" userId="ad5a436fb529fd67" providerId="LiveId" clId="{99D4D380-6BE3-4538-8C7C-DBE8CC44D844}" dt="2023-11-14T15:13:42.850" v="44" actId="33524"/>
+        <pc:sldMkLst>
+          <pc:docMk/>
+          <pc:sldMk cId="770946732" sldId="264"/>
+        </pc:sldMkLst>
+        <pc:spChg chg="mod">
+          <ac:chgData name="Prakit Mohal" userId="ad5a436fb529fd67" providerId="LiveId" clId="{99D4D380-6BE3-4538-8C7C-DBE8CC44D844}" dt="2023-11-14T15:13:42.850" v="44" actId="33524"/>
+          <ac:spMkLst>
+            <pc:docMk/>
+            <pc:sldMk cId="770946732" sldId="264"/>
+            <ac:spMk id="3" creationId="{434FB908-EDB6-0CE3-10C2-124CB2CEE514}"/>
+          </ac:spMkLst>
+        </pc:spChg>
+      </pc:sldChg>
+      <pc:sldChg chg="modSp mod">
+        <pc:chgData name="Prakit Mohal" userId="ad5a436fb529fd67" providerId="LiveId" clId="{99D4D380-6BE3-4538-8C7C-DBE8CC44D844}" dt="2023-11-14T15:14:14.104" v="47" actId="27636"/>
+        <pc:sldMkLst>
+          <pc:docMk/>
+          <pc:sldMk cId="1524317731" sldId="266"/>
+        </pc:sldMkLst>
+        <pc:spChg chg="mod">
+          <ac:chgData name="Prakit Mohal" userId="ad5a436fb529fd67" providerId="LiveId" clId="{99D4D380-6BE3-4538-8C7C-DBE8CC44D844}" dt="2023-11-14T15:14:14.104" v="47" actId="27636"/>
+          <ac:spMkLst>
+            <pc:docMk/>
+            <pc:sldMk cId="1524317731" sldId="266"/>
+            <ac:spMk id="3" creationId="{9C1E3546-6835-0FF5-B33C-0A7E64A3F4FC}"/>
+          </ac:spMkLst>
+        </pc:spChg>
+      </pc:sldChg>
+      <pc:sldChg chg="modSp mod">
+        <pc:chgData name="Prakit Mohal" userId="ad5a436fb529fd67" providerId="LiveId" clId="{99D4D380-6BE3-4538-8C7C-DBE8CC44D844}" dt="2023-11-14T15:14:22.069" v="48" actId="33524"/>
+        <pc:sldMkLst>
+          <pc:docMk/>
+          <pc:sldMk cId="4004658624" sldId="267"/>
+        </pc:sldMkLst>
+        <pc:spChg chg="mod">
+          <ac:chgData name="Prakit Mohal" userId="ad5a436fb529fd67" providerId="LiveId" clId="{99D4D380-6BE3-4538-8C7C-DBE8CC44D844}" dt="2023-11-14T15:14:22.069" v="48" actId="33524"/>
+          <ac:spMkLst>
+            <pc:docMk/>
+            <pc:sldMk cId="4004658624" sldId="267"/>
+            <ac:spMk id="3" creationId="{1434CDDD-99EF-828D-6A8D-D75A8F30B3AF}"/>
+          </ac:spMkLst>
+        </pc:spChg>
+      </pc:sldChg>
+      <pc:sldChg chg="modSp mod">
+        <pc:chgData name="Prakit Mohal" userId="ad5a436fb529fd67" providerId="LiveId" clId="{99D4D380-6BE3-4538-8C7C-DBE8CC44D844}" dt="2023-11-14T15:38:12.025" v="615" actId="20577"/>
+        <pc:sldMkLst>
+          <pc:docMk/>
+          <pc:sldMk cId="1457559676" sldId="268"/>
+        </pc:sldMkLst>
+        <pc:spChg chg="mod">
+          <ac:chgData name="Prakit Mohal" userId="ad5a436fb529fd67" providerId="LiveId" clId="{99D4D380-6BE3-4538-8C7C-DBE8CC44D844}" dt="2023-11-14T15:38:12.025" v="615" actId="20577"/>
+          <ac:spMkLst>
+            <pc:docMk/>
+            <pc:sldMk cId="1457559676" sldId="268"/>
+            <ac:spMk id="3" creationId="{F3A94E41-F000-D385-1C8B-B5AA79EB7EDE}"/>
+          </ac:spMkLst>
+        </pc:spChg>
+      </pc:sldChg>
+      <pc:sldChg chg="modSp mod">
+        <pc:chgData name="Prakit Mohal" userId="ad5a436fb529fd67" providerId="LiveId" clId="{99D4D380-6BE3-4538-8C7C-DBE8CC44D844}" dt="2023-11-14T15:16:34.974" v="71" actId="33524"/>
+        <pc:sldMkLst>
+          <pc:docMk/>
+          <pc:sldMk cId="3707293796" sldId="270"/>
+        </pc:sldMkLst>
+        <pc:spChg chg="mod">
+          <ac:chgData name="Prakit Mohal" userId="ad5a436fb529fd67" providerId="LiveId" clId="{99D4D380-6BE3-4538-8C7C-DBE8CC44D844}" dt="2023-11-14T15:16:34.974" v="71" actId="33524"/>
+          <ac:spMkLst>
+            <pc:docMk/>
+            <pc:sldMk cId="3707293796" sldId="270"/>
+            <ac:spMk id="3" creationId="{E0D6CFB2-11F3-95FC-410A-822D6E21AF43}"/>
+          </ac:spMkLst>
+        </pc:spChg>
+      </pc:sldChg>
+      <pc:sldChg chg="modSp mod">
+        <pc:chgData name="Prakit Mohal" userId="ad5a436fb529fd67" providerId="LiveId" clId="{99D4D380-6BE3-4538-8C7C-DBE8CC44D844}" dt="2023-11-14T15:16:51.338" v="72" actId="33524"/>
+        <pc:sldMkLst>
+          <pc:docMk/>
+          <pc:sldMk cId="4201927104" sldId="271"/>
+        </pc:sldMkLst>
+        <pc:spChg chg="mod">
+          <ac:chgData name="Prakit Mohal" userId="ad5a436fb529fd67" providerId="LiveId" clId="{99D4D380-6BE3-4538-8C7C-DBE8CC44D844}" dt="2023-11-14T15:16:51.338" v="72" actId="33524"/>
+          <ac:spMkLst>
+            <pc:docMk/>
+            <pc:sldMk cId="4201927104" sldId="271"/>
+            <ac:spMk id="3" creationId="{ECF10E17-1A20-0CFB-7751-A9258085ABF9}"/>
+          </ac:spMkLst>
+        </pc:spChg>
+      </pc:sldChg>
+      <pc:sldChg chg="modSp mod">
+        <pc:chgData name="Prakit Mohal" userId="ad5a436fb529fd67" providerId="LiveId" clId="{99D4D380-6BE3-4538-8C7C-DBE8CC44D844}" dt="2023-11-14T15:16:23.278" v="70" actId="20577"/>
+        <pc:sldMkLst>
+          <pc:docMk/>
+          <pc:sldMk cId="2028241436" sldId="275"/>
+        </pc:sldMkLst>
+        <pc:spChg chg="mod">
+          <ac:chgData name="Prakit Mohal" userId="ad5a436fb529fd67" providerId="LiveId" clId="{99D4D380-6BE3-4538-8C7C-DBE8CC44D844}" dt="2023-11-14T15:16:23.278" v="70" actId="20577"/>
+          <ac:spMkLst>
+            <pc:docMk/>
+            <pc:sldMk cId="2028241436" sldId="275"/>
+            <ac:spMk id="3" creationId="{0F0F7511-85B3-E8C4-CA66-616172DF99D4}"/>
+          </ac:spMkLst>
+        </pc:spChg>
+      </pc:sldChg>
+      <pc:sldChg chg="modSp mod">
+        <pc:chgData name="Prakit Mohal" userId="ad5a436fb529fd67" providerId="LiveId" clId="{99D4D380-6BE3-4538-8C7C-DBE8CC44D844}" dt="2023-11-14T15:17:01.729" v="73" actId="33524"/>
+        <pc:sldMkLst>
+          <pc:docMk/>
+          <pc:sldMk cId="488056011" sldId="276"/>
+        </pc:sldMkLst>
+        <pc:spChg chg="mod">
+          <ac:chgData name="Prakit Mohal" userId="ad5a436fb529fd67" providerId="LiveId" clId="{99D4D380-6BE3-4538-8C7C-DBE8CC44D844}" dt="2023-11-14T15:17:01.729" v="73" actId="33524"/>
+          <ac:spMkLst>
+            <pc:docMk/>
+            <pc:sldMk cId="488056011" sldId="276"/>
+            <ac:spMk id="3" creationId="{0137D52E-1485-B9DD-AEFA-919421479A0F}"/>
+          </ac:spMkLst>
+        </pc:spChg>
+      </pc:sldChg>
+      <pc:sldChg chg="modSp mod">
+        <pc:chgData name="Prakit Mohal" userId="ad5a436fb529fd67" providerId="LiveId" clId="{99D4D380-6BE3-4538-8C7C-DBE8CC44D844}" dt="2023-11-14T15:17:28.163" v="75" actId="33524"/>
+        <pc:sldMkLst>
+          <pc:docMk/>
+          <pc:sldMk cId="1247778244" sldId="277"/>
+        </pc:sldMkLst>
+        <pc:spChg chg="mod">
+          <ac:chgData name="Prakit Mohal" userId="ad5a436fb529fd67" providerId="LiveId" clId="{99D4D380-6BE3-4538-8C7C-DBE8CC44D844}" dt="2023-11-14T15:17:28.163" v="75" actId="33524"/>
+          <ac:spMkLst>
+            <pc:docMk/>
+            <pc:sldMk cId="1247778244" sldId="277"/>
+            <ac:spMk id="3" creationId="{3515D557-D23F-F5AB-B89D-3F410D2B60EA}"/>
+          </ac:spMkLst>
+        </pc:spChg>
+      </pc:sldChg>
+      <pc:sldChg chg="addSp delSp modSp mod">
+        <pc:chgData name="Prakit Mohal" userId="ad5a436fb529fd67" providerId="LiveId" clId="{99D4D380-6BE3-4538-8C7C-DBE8CC44D844}" dt="2023-11-14T15:36:19.167" v="595"/>
+        <pc:sldMkLst>
+          <pc:docMk/>
+          <pc:sldMk cId="1796773855" sldId="280"/>
+        </pc:sldMkLst>
+        <pc:spChg chg="mod">
+          <ac:chgData name="Prakit Mohal" userId="ad5a436fb529fd67" providerId="LiveId" clId="{99D4D380-6BE3-4538-8C7C-DBE8CC44D844}" dt="2023-11-14T15:15:06.479" v="50" actId="33524"/>
+          <ac:spMkLst>
+            <pc:docMk/>
+            <pc:sldMk cId="1796773855" sldId="280"/>
+            <ac:spMk id="3" creationId="{AB52FA4C-5CA2-BDD5-DF32-04D1E6CB2CD9}"/>
+          </ac:spMkLst>
+        </pc:spChg>
+        <pc:graphicFrameChg chg="del">
+          <ac:chgData name="Prakit Mohal" userId="ad5a436fb529fd67" providerId="LiveId" clId="{99D4D380-6BE3-4538-8C7C-DBE8CC44D844}" dt="2023-11-14T15:30:30.696" v="76" actId="478"/>
+          <ac:graphicFrameMkLst>
+            <pc:docMk/>
+            <pc:sldMk cId="1796773855" sldId="280"/>
+            <ac:graphicFrameMk id="5" creationId="{79C472CE-CC97-5B8E-1686-2A07ED9B51D3}"/>
+          </ac:graphicFrameMkLst>
+        </pc:graphicFrameChg>
+        <pc:picChg chg="add del mod">
+          <ac:chgData name="Prakit Mohal" userId="ad5a436fb529fd67" providerId="LiveId" clId="{99D4D380-6BE3-4538-8C7C-DBE8CC44D844}" dt="2023-11-14T15:30:49.124" v="79" actId="478"/>
+          <ac:picMkLst>
+            <pc:docMk/>
+            <pc:sldMk cId="1796773855" sldId="280"/>
+            <ac:picMk id="6" creationId="{2AA82D0B-BFEE-89BE-3869-DFE210A552AE}"/>
+          </ac:picMkLst>
+        </pc:picChg>
+        <pc:picChg chg="add mod">
+          <ac:chgData name="Prakit Mohal" userId="ad5a436fb529fd67" providerId="LiveId" clId="{99D4D380-6BE3-4538-8C7C-DBE8CC44D844}" dt="2023-11-14T15:36:19.167" v="595"/>
+          <ac:picMkLst>
+            <pc:docMk/>
+            <pc:sldMk cId="1796773855" sldId="280"/>
+            <ac:picMk id="8" creationId="{01A12574-187E-F6B1-4341-35469F994C42}"/>
+          </ac:picMkLst>
+        </pc:picChg>
+      </pc:sldChg>
+      <pc:sldChg chg="modSp mod">
+        <pc:chgData name="Prakit Mohal" userId="ad5a436fb529fd67" providerId="LiveId" clId="{99D4D380-6BE3-4538-8C7C-DBE8CC44D844}" dt="2023-11-14T15:12:38.068" v="35" actId="33524"/>
+        <pc:sldMkLst>
+          <pc:docMk/>
+          <pc:sldMk cId="3780654101" sldId="282"/>
+        </pc:sldMkLst>
+        <pc:spChg chg="mod">
+          <ac:chgData name="Prakit Mohal" userId="ad5a436fb529fd67" providerId="LiveId" clId="{99D4D380-6BE3-4538-8C7C-DBE8CC44D844}" dt="2023-11-14T15:12:38.068" v="35" actId="33524"/>
+          <ac:spMkLst>
+            <pc:docMk/>
+            <pc:sldMk cId="3780654101" sldId="282"/>
+            <ac:spMk id="3" creationId="{CAAB1A11-4271-A279-8CA4-E92A5DCA47A3}"/>
+          </ac:spMkLst>
+        </pc:spChg>
+      </pc:sldChg>
+      <pc:sldChg chg="modSp mod">
+        <pc:chgData name="Prakit Mohal" userId="ad5a436fb529fd67" providerId="LiveId" clId="{99D4D380-6BE3-4538-8C7C-DBE8CC44D844}" dt="2023-11-14T15:13:08.742" v="37" actId="33524"/>
+        <pc:sldMkLst>
+          <pc:docMk/>
+          <pc:sldMk cId="2451016579" sldId="283"/>
+        </pc:sldMkLst>
+        <pc:spChg chg="mod">
+          <ac:chgData name="Prakit Mohal" userId="ad5a436fb529fd67" providerId="LiveId" clId="{99D4D380-6BE3-4538-8C7C-DBE8CC44D844}" dt="2023-11-14T15:13:08.742" v="37" actId="33524"/>
+          <ac:spMkLst>
+            <pc:docMk/>
+            <pc:sldMk cId="2451016579" sldId="283"/>
+            <ac:spMk id="3" creationId="{2C6ED1CB-B658-506B-8D6E-01831B0DB665}"/>
+          </ac:spMkLst>
+        </pc:spChg>
+      </pc:sldChg>
+      <pc:sldChg chg="modSp new mod">
+        <pc:chgData name="Prakit Mohal" userId="ad5a436fb529fd67" providerId="LiveId" clId="{99D4D380-6BE3-4538-8C7C-DBE8CC44D844}" dt="2023-11-14T15:32:11.881" v="382" actId="20577"/>
+        <pc:sldMkLst>
+          <pc:docMk/>
+          <pc:sldMk cId="1847318085" sldId="284"/>
+        </pc:sldMkLst>
+        <pc:spChg chg="mod">
+          <ac:chgData name="Prakit Mohal" userId="ad5a436fb529fd67" providerId="LiveId" clId="{99D4D380-6BE3-4538-8C7C-DBE8CC44D844}" dt="2023-11-14T15:31:09.784" v="88" actId="20577"/>
+          <ac:spMkLst>
+            <pc:docMk/>
+            <pc:sldMk cId="1847318085" sldId="284"/>
+            <ac:spMk id="2" creationId="{814F0836-80B1-70BC-8692-26EB548734A8}"/>
+          </ac:spMkLst>
+        </pc:spChg>
+        <pc:spChg chg="mod">
+          <ac:chgData name="Prakit Mohal" userId="ad5a436fb529fd67" providerId="LiveId" clId="{99D4D380-6BE3-4538-8C7C-DBE8CC44D844}" dt="2023-11-14T15:32:11.881" v="382" actId="20577"/>
+          <ac:spMkLst>
+            <pc:docMk/>
+            <pc:sldMk cId="1847318085" sldId="284"/>
+            <ac:spMk id="3" creationId="{B51AE6D2-653D-99D4-7FAD-899B644874D7}"/>
+          </ac:spMkLst>
+        </pc:spChg>
+      </pc:sldChg>
+    </pc:docChg>
+  </pc:docChgLst>
+</pc:chgInfo>
 </file>
 
 <file path=ppt/slideLayouts/slideLayout1.xml><?xml version="1.0" encoding="utf-8"?>
@@ -640,7 +950,7 @@
             <a:fld id="{B61BEF0D-F0BB-DE4B-95CE-6DB70DBA9567}" type="datetimeFigureOut">
               <a:rPr lang="en-US" dirty="0"/>
               <a:pPr/>
-              <a:t>11/1/2022</a:t>
+              <a:t>11/14/2023</a:t>
             </a:fld>
             <a:endParaRPr lang="en-US" dirty="0"/>
           </a:p>
@@ -933,7 +1243,7 @@
             <a:fld id="{B61BEF0D-F0BB-DE4B-95CE-6DB70DBA9567}" type="datetimeFigureOut">
               <a:rPr lang="en-US" dirty="0"/>
               <a:pPr/>
-              <a:t>11/1/2022</a:t>
+              <a:t>11/14/2023</a:t>
             </a:fld>
             <a:endParaRPr lang="en-US" dirty="0"/>
           </a:p>
@@ -1178,7 +1488,7 @@
             <a:fld id="{B61BEF0D-F0BB-DE4B-95CE-6DB70DBA9567}" type="datetimeFigureOut">
               <a:rPr lang="en-US" dirty="0"/>
               <a:pPr/>
-              <a:t>11/1/2022</a:t>
+              <a:t>11/14/2023</a:t>
             </a:fld>
             <a:endParaRPr lang="en-US" dirty="0"/>
           </a:p>
@@ -1715,7 +2025,7 @@
             <a:fld id="{B61BEF0D-F0BB-DE4B-95CE-6DB70DBA9567}" type="datetimeFigureOut">
               <a:rPr lang="en-US" dirty="0"/>
               <a:pPr/>
-              <a:t>11/1/2022</a:t>
+              <a:t>11/14/2023</a:t>
             </a:fld>
             <a:endParaRPr lang="en-US" dirty="0"/>
           </a:p>
@@ -1960,7 +2270,7 @@
             <a:fld id="{B61BEF0D-F0BB-DE4B-95CE-6DB70DBA9567}" type="datetimeFigureOut">
               <a:rPr lang="en-US" dirty="0"/>
               <a:pPr/>
-              <a:t>11/1/2022</a:t>
+              <a:t>11/14/2023</a:t>
             </a:fld>
             <a:endParaRPr lang="en-US" dirty="0"/>
           </a:p>
@@ -2489,7 +2799,7 @@
             <a:fld id="{B61BEF0D-F0BB-DE4B-95CE-6DB70DBA9567}" type="datetimeFigureOut">
               <a:rPr lang="en-US" dirty="0"/>
               <a:pPr/>
-              <a:t>11/1/2022</a:t>
+              <a:t>11/14/2023</a:t>
             </a:fld>
             <a:endParaRPr lang="en-US" dirty="0"/>
           </a:p>
@@ -2783,7 +3093,7 @@
             <a:fld id="{B61BEF0D-F0BB-DE4B-95CE-6DB70DBA9567}" type="datetimeFigureOut">
               <a:rPr lang="en-US" dirty="0"/>
               <a:pPr/>
-              <a:t>11/1/2022</a:t>
+              <a:t>11/14/2023</a:t>
             </a:fld>
             <a:endParaRPr lang="en-US" dirty="0"/>
           </a:p>
@@ -2954,7 +3264,7 @@
             <a:fld id="{B61BEF0D-F0BB-DE4B-95CE-6DB70DBA9567}" type="datetimeFigureOut">
               <a:rPr lang="en-US" dirty="0"/>
               <a:pPr/>
-              <a:t>11/1/2022</a:t>
+              <a:t>11/14/2023</a:t>
             </a:fld>
             <a:endParaRPr lang="en-US" dirty="0"/>
           </a:p>
@@ -3131,7 +3441,7 @@
             <a:fld id="{B61BEF0D-F0BB-DE4B-95CE-6DB70DBA9567}" type="datetimeFigureOut">
               <a:rPr lang="en-US" dirty="0"/>
               <a:pPr/>
-              <a:t>11/1/2022</a:t>
+              <a:t>11/14/2023</a:t>
             </a:fld>
             <a:endParaRPr lang="en-US" dirty="0"/>
           </a:p>
@@ -3298,7 +3608,7 @@
             <a:fld id="{B61BEF0D-F0BB-DE4B-95CE-6DB70DBA9567}" type="datetimeFigureOut">
               <a:rPr lang="en-US" dirty="0"/>
               <a:pPr/>
-              <a:t>11/1/2022</a:t>
+              <a:t>11/14/2023</a:t>
             </a:fld>
             <a:endParaRPr lang="en-US" dirty="0"/>
           </a:p>
@@ -3546,7 +3856,7 @@
             <a:fld id="{B61BEF0D-F0BB-DE4B-95CE-6DB70DBA9567}" type="datetimeFigureOut">
               <a:rPr lang="en-US" dirty="0"/>
               <a:pPr/>
-              <a:t>11/1/2022</a:t>
+              <a:t>11/14/2023</a:t>
             </a:fld>
             <a:endParaRPr lang="en-US" dirty="0"/>
           </a:p>
@@ -3840,7 +4150,7 @@
             <a:fld id="{B61BEF0D-F0BB-DE4B-95CE-6DB70DBA9567}" type="datetimeFigureOut">
               <a:rPr lang="en-US" dirty="0"/>
               <a:pPr/>
-              <a:t>11/1/2022</a:t>
+              <a:t>11/14/2023</a:t>
             </a:fld>
             <a:endParaRPr lang="en-US" dirty="0"/>
           </a:p>
@@ -4279,7 +4589,7 @@
             <a:fld id="{B61BEF0D-F0BB-DE4B-95CE-6DB70DBA9567}" type="datetimeFigureOut">
               <a:rPr lang="en-US" dirty="0"/>
               <a:pPr/>
-              <a:t>11/1/2022</a:t>
+              <a:t>11/14/2023</a:t>
             </a:fld>
             <a:endParaRPr lang="en-US" dirty="0"/>
           </a:p>
@@ -4394,7 +4704,7 @@
             <a:fld id="{B61BEF0D-F0BB-DE4B-95CE-6DB70DBA9567}" type="datetimeFigureOut">
               <a:rPr lang="en-US" dirty="0"/>
               <a:pPr/>
-              <a:t>11/1/2022</a:t>
+              <a:t>11/14/2023</a:t>
             </a:fld>
             <a:endParaRPr lang="en-US" dirty="0"/>
           </a:p>
@@ -4486,7 +4796,7 @@
             <a:fld id="{B61BEF0D-F0BB-DE4B-95CE-6DB70DBA9567}" type="datetimeFigureOut">
               <a:rPr lang="en-US" dirty="0"/>
               <a:pPr/>
-              <a:t>11/1/2022</a:t>
+              <a:t>11/14/2023</a:t>
             </a:fld>
             <a:endParaRPr lang="en-US" dirty="0"/>
           </a:p>
@@ -4766,7 +5076,7 @@
             <a:fld id="{B61BEF0D-F0BB-DE4B-95CE-6DB70DBA9567}" type="datetimeFigureOut">
               <a:rPr lang="en-US" dirty="0"/>
               <a:pPr/>
-              <a:t>11/1/2022</a:t>
+              <a:t>11/14/2023</a:t>
             </a:fld>
             <a:endParaRPr lang="en-US" dirty="0"/>
           </a:p>
@@ -5054,7 +5364,7 @@
             <a:fld id="{B61BEF0D-F0BB-DE4B-95CE-6DB70DBA9567}" type="datetimeFigureOut">
               <a:rPr lang="en-US" dirty="0"/>
               <a:pPr/>
-              <a:t>11/1/2022</a:t>
+              <a:t>11/14/2023</a:t>
             </a:fld>
             <a:endParaRPr lang="en-US" dirty="0"/>
           </a:p>
@@ -5581,7 +5891,7 @@
             <a:fld id="{B61BEF0D-F0BB-DE4B-95CE-6DB70DBA9567}" type="datetimeFigureOut">
               <a:rPr lang="en-US" dirty="0"/>
               <a:pPr/>
-              <a:t>11/1/2022</a:t>
+              <a:t>11/14/2023</a:t>
             </a:fld>
             <a:endParaRPr lang="en-US" dirty="0"/>
           </a:p>
@@ -6158,15 +6468,14 @@
           <a:lstStyle/>
           <a:p>
             <a:r>
-              <a:rPr lang="en-US"/>
+              <a:rPr lang="en-US" dirty="0"/>
               <a:t>Prakit Mohal</a:t>
             </a:r>
-            <a:endParaRPr lang="en-US" dirty="0"/>
-          </a:p>
-          <a:p>
-            <a:r>
-              <a:rPr lang="en-US" dirty="0"/>
-              <a:t>November 3, 2022</a:t>
+          </a:p>
+          <a:p>
+            <a:r>
+              <a:rPr lang="en-US" dirty="0"/>
+              <a:t>November 16, 2023</a:t>
             </a:r>
           </a:p>
         </p:txBody>
@@ -6260,7 +6569,7 @@
           <a:p>
             <a:r>
               <a:rPr lang="en-US" dirty="0"/>
-              <a:t>I recommend including the course numbers so that if the person reviewing your resume went to your school they can immediately figure out what courses you’ve taken</a:t>
+              <a:t>I recommend including the course numbers so that if the person reviewing your resume went to your school, they can immediately figure out what courses you’ve taken</a:t>
             </a:r>
           </a:p>
           <a:p>
@@ -6386,7 +6695,7 @@
             <a:pPr lvl="1"/>
             <a:r>
               <a:rPr lang="en-US" dirty="0"/>
-              <a:t>In my experience as long as it was above a 3.0 it should be included</a:t>
+              <a:t>In my experience if it was above a 3.0 it should be included</a:t>
             </a:r>
           </a:p>
         </p:txBody>
@@ -6480,14 +6789,14 @@
           <a:p>
             <a:r>
               <a:rPr lang="en-US" dirty="0"/>
-              <a:t>If you haven’t had an internship you can include things like research projects or other activities</a:t>
+              <a:t>If you haven’t had an internship, you can include things like research projects or other activities</a:t>
             </a:r>
           </a:p>
           <a:p>
             <a:pPr lvl="1"/>
             <a:r>
               <a:rPr lang="en-US" dirty="0"/>
-              <a:t>If you have any publications you definitely want to list them</a:t>
+              <a:t>If you have any publications, you want to list them</a:t>
             </a:r>
           </a:p>
           <a:p>
@@ -6499,20 +6808,20 @@
           <a:p>
             <a:r>
               <a:rPr lang="en-US" dirty="0"/>
-              <a:t>Even if it’s a required course, you can list a project especially if it stood out, such as a capstone project</a:t>
-            </a:r>
-          </a:p>
-          <a:p>
-            <a:r>
-              <a:rPr lang="en-US" dirty="0"/>
-              <a:t>Unless you’re really lacking for experience I would not put your summer job flipping burgers at Sheetz</a:t>
+              <a:t>Even if it’s a required course, you could list a project especially if it stood out, such as a capstone project</a:t>
+            </a:r>
+          </a:p>
+          <a:p>
+            <a:r>
+              <a:rPr lang="en-US" dirty="0"/>
+              <a:t>Unless you’re really lacking for experience, I would not put your summer job flipping burgers at Sheetz</a:t>
             </a:r>
           </a:p>
           <a:p>
             <a:pPr lvl="1"/>
             <a:r>
               <a:rPr lang="en-US" dirty="0"/>
-              <a:t>That being said, if you have to resort to that try to highlight any leadership roles that you can</a:t>
+              <a:t>If you must resort to that try to highlight any leadership roles that you can</a:t>
             </a:r>
           </a:p>
         </p:txBody>
@@ -6594,7 +6903,7 @@
         <p:spPr/>
         <p:txBody>
           <a:bodyPr>
-            <a:normAutofit fontScale="92500" lnSpcReduction="10000"/>
+            <a:normAutofit fontScale="92500"/>
           </a:bodyPr>
           <a:lstStyle/>
           <a:p>
@@ -6627,13 +6936,13 @@
           <a:p>
             <a:r>
               <a:rPr lang="en-US" dirty="0"/>
-              <a:t>You’ll want to clearly highlight what YOU did, this is not the time to be modest!</a:t>
-            </a:r>
-          </a:p>
-          <a:p>
-            <a:r>
-              <a:rPr lang="en-US" dirty="0"/>
-              <a:t>That being said, you will be asked about what you’re claiming, so please be able to back them up</a:t>
+              <a:t>You’ll want to clearly highlight what YOU did; this is not the time to be modest!</a:t>
+            </a:r>
+          </a:p>
+          <a:p>
+            <a:r>
+              <a:rPr lang="en-US" dirty="0"/>
+              <a:t>You will be asked about what you’re claiming, so please be able to back them up</a:t>
             </a:r>
           </a:p>
         </p:txBody>
@@ -6747,7 +7056,7 @@
           <a:p>
             <a:r>
               <a:rPr lang="en-US" dirty="0"/>
-              <a:t>That being said, if you’re involved in any cool or unusual activities, you should list those as well since it makes a great conversation starter</a:t>
+              <a:t>If you’re involved in any cool or unusual activities, you should list those as well since it makes a great conversation starter</a:t>
             </a:r>
           </a:p>
         </p:txBody>
@@ -6835,7 +7144,15 @@
           <a:p>
             <a:r>
               <a:rPr lang="en-US" dirty="0"/>
-              <a:t>If you have had a security clearance list if it you’re applying to anything government related, it means an instant cost savings for the employer</a:t>
+              <a:t>If you have had a security clearance list </a:t>
+            </a:r>
+            <a:r>
+              <a:rPr lang="en-US"/>
+              <a:t>it if </a:t>
+            </a:r>
+            <a:r>
+              <a:rPr lang="en-US" dirty="0"/>
+              <a:t>you’re applying to anything government related, it means an instant cost savings for the employer</a:t>
             </a:r>
           </a:p>
           <a:p>
@@ -6848,21 +7165,8 @@
             <a:pPr lvl="1"/>
             <a:r>
               <a:rPr lang="en-US" dirty="0"/>
-              <a:t>Many companies can’t sponsor or cant hire green </a:t>
-            </a:r>
-            <a:r>
-              <a:rPr lang="en-US"/>
-              <a:t>card holders </a:t>
-            </a:r>
-            <a:r>
-              <a:rPr lang="en-US" dirty="0"/>
-              <a:t>and it saves </a:t>
-            </a:r>
-            <a:r>
-              <a:rPr lang="en-US"/>
-              <a:t>everyone time</a:t>
-            </a:r>
-            <a:endParaRPr lang="en-US" dirty="0"/>
+              <a:t>Many companies can’t sponsor or can't hire green card holders and it saves everyone time</a:t>
+            </a:r>
           </a:p>
           <a:p>
             <a:r>
@@ -7182,85 +7486,59 @@
           <a:p>
             <a:r>
               <a:rPr lang="en-US" dirty="0"/>
-              <a:t>Yes this is a clearly fake resume, but the formatting is what you’re aiming for</a:t>
-            </a:r>
-          </a:p>
-          <a:p>
-            <a:r>
-              <a:rPr lang="en-US" dirty="0"/>
-              <a:t>This presentation and resume will be available if you want to use this as </a:t>
-            </a:r>
-            <a:r>
-              <a:rPr lang="en-US"/>
-              <a:t>a guide</a:t>
-            </a:r>
-            <a:endParaRPr lang="en-US" dirty="0"/>
-          </a:p>
-        </p:txBody>
-      </p:sp>
-      <p:graphicFrame>
-        <p:nvGraphicFramePr>
-          <p:cNvPr id="5" name="Object 4" descr="Sample Fake Resume">
+              <a:t>Yes, this is a clearly fake resume, but the formatting is what you’re aiming for</a:t>
+            </a:r>
+          </a:p>
+          <a:p>
+            <a:r>
+              <a:rPr lang="en-US" dirty="0"/>
+              <a:t>This presentation and resume will be available if you want to use this as a guide</a:t>
+            </a:r>
+          </a:p>
+        </p:txBody>
+      </p:sp>
+      <p:pic>
+        <p:nvPicPr>
+          <p:cNvPr id="8" name="Picture 7">
             <a:extLst>
               <a:ext uri="{FF2B5EF4-FFF2-40B4-BE49-F238E27FC236}">
-                <a16:creationId xmlns:a16="http://schemas.microsoft.com/office/drawing/2014/main" id="{79C472CE-CC97-5B8E-1686-2A07ED9B51D3}"/>
+                <a16:creationId xmlns:a16="http://schemas.microsoft.com/office/drawing/2014/main" id="{01A12574-187E-F6B1-4341-35469F994C42}"/>
               </a:ext>
             </a:extLst>
           </p:cNvPr>
-          <p:cNvGraphicFramePr>
-            <a:graphicFrameLocks noChangeAspect="1"/>
-          </p:cNvGraphicFramePr>
-          <p:nvPr>
-            <p:extLst>
-              <p:ext uri="{D42A27DB-BD31-4B8C-83A1-F6EECF244321}">
-                <p14:modId xmlns:p14="http://schemas.microsoft.com/office/powerpoint/2010/main" val="1307453452"/>
-              </p:ext>
-            </p:extLst>
-          </p:nvPr>
-        </p:nvGraphicFramePr>
-        <p:xfrm>
-          <a:off x="6430061" y="122135"/>
-          <a:ext cx="4549966" cy="6613729"/>
-        </p:xfrm>
-        <a:graphic>
-          <a:graphicData uri="http://schemas.openxmlformats.org/presentationml/2006/ole">
-            <mc:AlternateContent xmlns:mc="http://schemas.openxmlformats.org/markup-compatibility/2006">
-              <mc:Choice xmlns:v="urn:schemas-microsoft-com:vml" Requires="v">
-                <p:oleObj name="Document" r:id="rId2" imgW="6152864" imgH="8943987" progId="Word.Document.12">
-                  <p:embed/>
-                </p:oleObj>
-              </mc:Choice>
-              <mc:Fallback>
-                <p:oleObj name="Document" r:id="rId2" imgW="6152864" imgH="8943987" progId="Word.Document.12">
-                  <p:embed/>
-                  <p:pic>
-                    <p:nvPicPr>
-                      <p:cNvPr id="0" name=""/>
-                      <p:cNvPicPr/>
-                      <p:nvPr/>
-                    </p:nvPicPr>
-                    <p:blipFill>
-                      <a:blip r:embed="rId3"/>
-                      <a:stretch>
-                        <a:fillRect/>
-                      </a:stretch>
-                    </p:blipFill>
-                    <p:spPr>
-                      <a:xfrm>
-                        <a:off x="6430061" y="122135"/>
-                        <a:ext cx="4549966" cy="6613729"/>
-                      </a:xfrm>
-                      <a:prstGeom prst="rect">
-                        <a:avLst/>
-                      </a:prstGeom>
-                    </p:spPr>
-                  </p:pic>
-                </p:oleObj>
-              </mc:Fallback>
-            </mc:AlternateContent>
-          </a:graphicData>
-        </a:graphic>
-      </p:graphicFrame>
+          <p:cNvPicPr>
+            <a:picLocks noChangeAspect="1"/>
+          </p:cNvPicPr>
+          <p:nvPr/>
+        </p:nvPicPr>
+        <p:blipFill>
+          <a:blip r:embed="rId2">
+            <a:clrChange>
+              <a:clrFrom>
+                <a:srgbClr val="FFFFFF"/>
+              </a:clrFrom>
+              <a:clrTo>
+                <a:srgbClr val="FFFFFF">
+                  <a:alpha val="0"/>
+                </a:srgbClr>
+              </a:clrTo>
+            </a:clrChange>
+            <a:alphaModFix/>
+          </a:blip>
+          <a:stretch>
+            <a:fillRect/>
+          </a:stretch>
+        </p:blipFill>
+        <p:spPr>
+          <a:xfrm>
+            <a:off x="6602799" y="94593"/>
+            <a:ext cx="4796290" cy="6668814"/>
+          </a:xfrm>
+          <a:prstGeom prst="rect">
+            <a:avLst/>
+          </a:prstGeom>
+        </p:spPr>
+      </p:pic>
     </p:spTree>
     <p:extLst>
       <p:ext uri="{BB962C8B-B14F-4D97-AF65-F5344CB8AC3E}">
@@ -7355,7 +7633,7 @@
           <a:p>
             <a:r>
               <a:rPr lang="en-US" dirty="0"/>
-              <a:t>Exception: if you’re having someone review your resume Word makes it a lot easier to make suggestions without them having to back convert it</a:t>
+              <a:t>Exception: if you’re having someone review your resume Word/Google Docs makes it a lot easier to make suggestions without them having to back convert it</a:t>
             </a:r>
           </a:p>
         </p:txBody>
@@ -7572,7 +7850,7 @@
           <a:p>
             <a:r>
               <a:rPr lang="en-US" dirty="0"/>
-              <a:t>Full disclosure: I can’t say if a cover letter has actually helped me get any of my jobs and I don’t recall reading very many of them</a:t>
+              <a:t>Full disclosure: I can’t say if a cover letter has helped me get any of my jobs and I don’t recall reading very many of them</a:t>
             </a:r>
           </a:p>
         </p:txBody>
@@ -7673,7 +7951,7 @@
           <a:p>
             <a:r>
               <a:rPr lang="en-US" dirty="0"/>
-              <a:t>Try to have multiple people review your resume in order to get feedback</a:t>
+              <a:t>Try to have multiple people review your resume to get feedback</a:t>
             </a:r>
           </a:p>
           <a:p>
@@ -7687,13 +7965,8 @@
             <a:pPr lvl="1"/>
             <a:r>
               <a:rPr lang="en-US" dirty="0"/>
-              <a:t>I still get my resume reviewed by </a:t>
-            </a:r>
-            <a:r>
-              <a:rPr lang="en-US"/>
-              <a:t>my friends to this day</a:t>
-            </a:r>
-            <a:endParaRPr lang="en-US" dirty="0"/>
+              <a:t>I still get my resume reviewed by my friends to this day</a:t>
+            </a:r>
           </a:p>
           <a:p>
             <a:r>
@@ -7745,7 +8018,7 @@
           <p:cNvPr id="2" name="Title 1">
             <a:extLst>
               <a:ext uri="{FF2B5EF4-FFF2-40B4-BE49-F238E27FC236}">
-                <a16:creationId xmlns:a16="http://schemas.microsoft.com/office/drawing/2014/main" id="{13778129-292C-2EA5-A01C-E1CADE3B6A06}"/>
+                <a16:creationId xmlns:a16="http://schemas.microsoft.com/office/drawing/2014/main" id="{814F0836-80B1-70BC-8692-26EB548734A8}"/>
               </a:ext>
             </a:extLst>
           </p:cNvPr>
@@ -7763,7 +8036,7 @@
           <a:p>
             <a:r>
               <a:rPr lang="en-US" dirty="0"/>
-              <a:t>I’ve got a resume what now</a:t>
+              <a:t>Using AI</a:t>
             </a:r>
           </a:p>
         </p:txBody>
@@ -7773,7 +8046,7 @@
           <p:cNvPr id="3" name="Content Placeholder 2">
             <a:extLst>
               <a:ext uri="{FF2B5EF4-FFF2-40B4-BE49-F238E27FC236}">
-                <a16:creationId xmlns:a16="http://schemas.microsoft.com/office/drawing/2014/main" id="{0137D52E-1485-B9DD-AEFA-919421479A0F}"/>
+                <a16:creationId xmlns:a16="http://schemas.microsoft.com/office/drawing/2014/main" id="{B51AE6D2-653D-99D4-7FAD-899B644874D7}"/>
               </a:ext>
             </a:extLst>
           </p:cNvPr>
@@ -7786,57 +8059,33 @@
         </p:nvSpPr>
         <p:spPr/>
         <p:txBody>
-          <a:bodyPr>
-            <a:normAutofit lnSpcReduction="10000"/>
-          </a:bodyPr>
-          <a:lstStyle/>
-          <a:p>
-            <a:r>
-              <a:rPr lang="en-US" dirty="0"/>
-              <a:t>Apply to companies, whether online or at your career fair</a:t>
+          <a:bodyPr/>
+          <a:lstStyle/>
+          <a:p>
+            <a:r>
+              <a:rPr lang="en-US" dirty="0"/>
+              <a:t>ChatGPT and similar tools are all the rage right now</a:t>
+            </a:r>
+          </a:p>
+          <a:p>
+            <a:r>
+              <a:rPr lang="en-US" dirty="0"/>
+              <a:t>Note that it’s obvious when someone has told ChatGPT to create a resume or cover letter for them</a:t>
             </a:r>
           </a:p>
           <a:p>
             <a:pPr lvl="1"/>
             <a:r>
               <a:rPr lang="en-US" dirty="0"/>
-              <a:t>Yes applying online does work, and may even be a requirement even if you hand over a paper resume so that you’re “in the system”</a:t>
-            </a:r>
-          </a:p>
-          <a:p>
-            <a:r>
-              <a:rPr lang="en-US" dirty="0"/>
-              <a:t>No company is beneath you</a:t>
-            </a:r>
-          </a:p>
-          <a:p>
-            <a:pPr lvl="1"/>
-            <a:r>
-              <a:rPr lang="en-US" dirty="0"/>
-              <a:t>That company with the nonexistent line with the bored looking reps would LOVE for you to talk to them, and you may learn something cool about them too</a:t>
-            </a:r>
-          </a:p>
-          <a:p>
-            <a:pPr lvl="1"/>
-            <a:r>
-              <a:rPr lang="en-US" dirty="0"/>
-              <a:t>You’d be surprised what those more unknown companies are up to; my first employer sent me to UAE, Romania, and Bulgaria, places I never would’ve gone </a:t>
-            </a:r>
-            <a:r>
-              <a:rPr lang="en-US"/>
-              <a:t>to otherwise</a:t>
-            </a:r>
-            <a:endParaRPr lang="en-US" dirty="0"/>
-          </a:p>
-          <a:p>
-            <a:endParaRPr lang="en-US" dirty="0"/>
+              <a:t>It’s helpful to use it as a guide and to double check your work, but don’t solely rely on it</a:t>
+            </a:r>
           </a:p>
         </p:txBody>
       </p:sp>
     </p:spTree>
     <p:extLst>
       <p:ext uri="{BB962C8B-B14F-4D97-AF65-F5344CB8AC3E}">
-        <p14:creationId xmlns:p14="http://schemas.microsoft.com/office/powerpoint/2010/main" val="488056011"/>
+        <p14:creationId xmlns:p14="http://schemas.microsoft.com/office/powerpoint/2010/main" val="1847318085"/>
       </p:ext>
     </p:extLst>
   </p:cSld>
@@ -7868,7 +8117,7 @@
           <p:cNvPr id="2" name="Title 1">
             <a:extLst>
               <a:ext uri="{FF2B5EF4-FFF2-40B4-BE49-F238E27FC236}">
-                <a16:creationId xmlns:a16="http://schemas.microsoft.com/office/drawing/2014/main" id="{63998639-715F-1C98-19CB-3AD66EF76BE9}"/>
+                <a16:creationId xmlns:a16="http://schemas.microsoft.com/office/drawing/2014/main" id="{13778129-292C-2EA5-A01C-E1CADE3B6A06}"/>
               </a:ext>
             </a:extLst>
           </p:cNvPr>
@@ -7886,7 +8135,7 @@
           <a:p>
             <a:r>
               <a:rPr lang="en-US" dirty="0"/>
-              <a:t>What do you look for at a career fair?</a:t>
+              <a:t>I’ve got a resume what now</a:t>
             </a:r>
           </a:p>
         </p:txBody>
@@ -7896,7 +8145,7 @@
           <p:cNvPr id="3" name="Content Placeholder 2">
             <a:extLst>
               <a:ext uri="{FF2B5EF4-FFF2-40B4-BE49-F238E27FC236}">
-                <a16:creationId xmlns:a16="http://schemas.microsoft.com/office/drawing/2014/main" id="{D2052F56-BEC5-E377-8860-791309B1A648}"/>
+                <a16:creationId xmlns:a16="http://schemas.microsoft.com/office/drawing/2014/main" id="{0137D52E-1485-B9DD-AEFA-919421479A0F}"/>
               </a:ext>
             </a:extLst>
           </p:cNvPr>
@@ -7910,40 +8159,51 @@
         <p:spPr/>
         <p:txBody>
           <a:bodyPr>
-            <a:normAutofit/>
+            <a:normAutofit lnSpcReduction="10000"/>
           </a:bodyPr>
           <a:lstStyle/>
           <a:p>
             <a:r>
               <a:rPr lang="en-US" dirty="0"/>
-              <a:t>I will first ask if you’ve heard of us and know anything about what we do</a:t>
-            </a:r>
-          </a:p>
-          <a:p>
-            <a:r>
-              <a:rPr lang="en-US" dirty="0"/>
-              <a:t>I will then look and try to find interesting things on your resume to talk about to try to gauge interest</a:t>
-            </a:r>
-          </a:p>
-          <a:p>
-            <a:r>
-              <a:rPr lang="en-US" dirty="0"/>
-              <a:t>I will also try to look for applicable experience</a:t>
+              <a:t>Apply to companies, whether online or at your career fair</a:t>
             </a:r>
           </a:p>
           <a:p>
             <a:pPr lvl="1"/>
             <a:r>
               <a:rPr lang="en-US" dirty="0"/>
-              <a:t>If you did a project for a major bank and you’re applying to financial services companies, you better have that listed so that they can ask you about it and help bump you up over other candidates without that experience</a:t>
-            </a:r>
+              <a:t>Yes, applying online does work, and may even be a requirement even if you hand over a paper resume so that you’re “in the system”</a:t>
+            </a:r>
+          </a:p>
+          <a:p>
+            <a:r>
+              <a:rPr lang="en-US" dirty="0"/>
+              <a:t>No company is beneath you</a:t>
+            </a:r>
+          </a:p>
+          <a:p>
+            <a:pPr lvl="1"/>
+            <a:r>
+              <a:rPr lang="en-US" dirty="0"/>
+              <a:t>That company with the nonexistent line with the bored looking reps would LOVE for you to talk to them, and you may learn something cool about them too</a:t>
+            </a:r>
+          </a:p>
+          <a:p>
+            <a:pPr lvl="1"/>
+            <a:r>
+              <a:rPr lang="en-US" dirty="0"/>
+              <a:t>You’d be surprised what those more unknown companies are up to; my first employer sent me to UAE, Romania, and Bulgaria, places I never would’ve gone to otherwise</a:t>
+            </a:r>
+          </a:p>
+          <a:p>
+            <a:endParaRPr lang="en-US" dirty="0"/>
           </a:p>
         </p:txBody>
       </p:sp>
     </p:spTree>
     <p:extLst>
       <p:ext uri="{BB962C8B-B14F-4D97-AF65-F5344CB8AC3E}">
-        <p14:creationId xmlns:p14="http://schemas.microsoft.com/office/powerpoint/2010/main" val="746057957"/>
+        <p14:creationId xmlns:p14="http://schemas.microsoft.com/office/powerpoint/2010/main" val="488056011"/>
       </p:ext>
     </p:extLst>
   </p:cSld>
@@ -7975,7 +8235,7 @@
           <p:cNvPr id="2" name="Title 1">
             <a:extLst>
               <a:ext uri="{FF2B5EF4-FFF2-40B4-BE49-F238E27FC236}">
-                <a16:creationId xmlns:a16="http://schemas.microsoft.com/office/drawing/2014/main" id="{9261917C-7233-97AB-6B12-598CC4917BD1}"/>
+                <a16:creationId xmlns:a16="http://schemas.microsoft.com/office/drawing/2014/main" id="{63998639-715F-1C98-19CB-3AD66EF76BE9}"/>
               </a:ext>
             </a:extLst>
           </p:cNvPr>
@@ -7993,7 +8253,7 @@
           <a:p>
             <a:r>
               <a:rPr lang="en-US" dirty="0"/>
-              <a:t>Sweet I got an interview</a:t>
+              <a:t>What do you look for at a career fair?</a:t>
             </a:r>
           </a:p>
         </p:txBody>
@@ -8003,7 +8263,7 @@
           <p:cNvPr id="3" name="Content Placeholder 2">
             <a:extLst>
               <a:ext uri="{FF2B5EF4-FFF2-40B4-BE49-F238E27FC236}">
-                <a16:creationId xmlns:a16="http://schemas.microsoft.com/office/drawing/2014/main" id="{3515D557-D23F-F5AB-B89D-3F410D2B60EA}"/>
+                <a16:creationId xmlns:a16="http://schemas.microsoft.com/office/drawing/2014/main" id="{D2052F56-BEC5-E377-8860-791309B1A648}"/>
               </a:ext>
             </a:extLst>
           </p:cNvPr>
@@ -8016,43 +8276,41 @@
         </p:nvSpPr>
         <p:spPr/>
         <p:txBody>
-          <a:bodyPr/>
-          <a:lstStyle/>
-          <a:p>
-            <a:r>
-              <a:rPr lang="en-US" dirty="0"/>
-              <a:t>If you get an email address thank your interviewer! They definitely appreciate it</a:t>
+          <a:bodyPr>
+            <a:normAutofit/>
+          </a:bodyPr>
+          <a:lstStyle/>
+          <a:p>
+            <a:r>
+              <a:rPr lang="en-US" dirty="0"/>
+              <a:t>I will first ask if you’ve heard of us and know anything about what we do</a:t>
+            </a:r>
+          </a:p>
+          <a:p>
+            <a:r>
+              <a:rPr lang="en-US" dirty="0"/>
+              <a:t>I will then look and try to find interesting things on your resume to talk about to try to gauge interest</a:t>
+            </a:r>
+          </a:p>
+          <a:p>
+            <a:r>
+              <a:rPr lang="en-US" dirty="0"/>
+              <a:t>I will also try to look for applicable experience</a:t>
             </a:r>
           </a:p>
           <a:p>
             <a:pPr lvl="1"/>
             <a:r>
               <a:rPr lang="en-US" dirty="0"/>
-              <a:t>An occasional follow up is fine, but keep in mind the person interviewing you isn’t necessarily the one making hiring decisions</a:t>
-            </a:r>
-          </a:p>
-          <a:p>
-            <a:r>
-              <a:rPr lang="en-US" dirty="0"/>
-              <a:t>Even if you don’t get selected ask for feedback</a:t>
-            </a:r>
-          </a:p>
-          <a:p>
-            <a:pPr lvl="1"/>
-            <a:r>
-              <a:rPr lang="en-US" dirty="0"/>
-              <a:t>It’s pretty rare that you’ll get it but the further along in the process the more likely it is you’ll get something actionable</a:t>
-            </a:r>
-          </a:p>
-          <a:p>
-            <a:endParaRPr lang="en-US" dirty="0"/>
+              <a:t>If you did a project for a major bank and you’re applying to financial services companies, you better have that listed so that they can ask you about it and help bump you up over other candidates without that experience</a:t>
+            </a:r>
           </a:p>
         </p:txBody>
       </p:sp>
     </p:spTree>
     <p:extLst>
       <p:ext uri="{BB962C8B-B14F-4D97-AF65-F5344CB8AC3E}">
-        <p14:creationId xmlns:p14="http://schemas.microsoft.com/office/powerpoint/2010/main" val="1247778244"/>
+        <p14:creationId xmlns:p14="http://schemas.microsoft.com/office/powerpoint/2010/main" val="746057957"/>
       </p:ext>
     </p:extLst>
   </p:cSld>
@@ -8084,6 +8342,115 @@
           <p:cNvPr id="2" name="Title 1">
             <a:extLst>
               <a:ext uri="{FF2B5EF4-FFF2-40B4-BE49-F238E27FC236}">
+                <a16:creationId xmlns:a16="http://schemas.microsoft.com/office/drawing/2014/main" id="{9261917C-7233-97AB-6B12-598CC4917BD1}"/>
+              </a:ext>
+            </a:extLst>
+          </p:cNvPr>
+          <p:cNvSpPr>
+            <a:spLocks noGrp="1"/>
+          </p:cNvSpPr>
+          <p:nvPr>
+            <p:ph type="title"/>
+          </p:nvPr>
+        </p:nvSpPr>
+        <p:spPr/>
+        <p:txBody>
+          <a:bodyPr/>
+          <a:lstStyle/>
+          <a:p>
+            <a:r>
+              <a:rPr lang="en-US" dirty="0"/>
+              <a:t>Sweet I got an interview</a:t>
+            </a:r>
+          </a:p>
+        </p:txBody>
+      </p:sp>
+      <p:sp>
+        <p:nvSpPr>
+          <p:cNvPr id="3" name="Content Placeholder 2">
+            <a:extLst>
+              <a:ext uri="{FF2B5EF4-FFF2-40B4-BE49-F238E27FC236}">
+                <a16:creationId xmlns:a16="http://schemas.microsoft.com/office/drawing/2014/main" id="{3515D557-D23F-F5AB-B89D-3F410D2B60EA}"/>
+              </a:ext>
+            </a:extLst>
+          </p:cNvPr>
+          <p:cNvSpPr>
+            <a:spLocks noGrp="1"/>
+          </p:cNvSpPr>
+          <p:nvPr>
+            <p:ph idx="1"/>
+          </p:nvPr>
+        </p:nvSpPr>
+        <p:spPr/>
+        <p:txBody>
+          <a:bodyPr/>
+          <a:lstStyle/>
+          <a:p>
+            <a:r>
+              <a:rPr lang="en-US" dirty="0"/>
+              <a:t>If you get an email address thank your interviewer! They appreciate it</a:t>
+            </a:r>
+          </a:p>
+          <a:p>
+            <a:pPr lvl="1"/>
+            <a:r>
+              <a:rPr lang="en-US" dirty="0"/>
+              <a:t>An occasional follow up is fine, but keep in mind the person interviewing you isn’t necessarily the one making hiring decisions</a:t>
+            </a:r>
+          </a:p>
+          <a:p>
+            <a:r>
+              <a:rPr lang="en-US" dirty="0"/>
+              <a:t>Even if you don’t get selected ask for feedback</a:t>
+            </a:r>
+          </a:p>
+          <a:p>
+            <a:pPr lvl="1"/>
+            <a:r>
+              <a:rPr lang="en-US" dirty="0"/>
+              <a:t>It’s rare that you’ll get it but the further along in the process the more likely it is you’ll get something actionable</a:t>
+            </a:r>
+          </a:p>
+          <a:p>
+            <a:endParaRPr lang="en-US" dirty="0"/>
+          </a:p>
+        </p:txBody>
+      </p:sp>
+    </p:spTree>
+    <p:extLst>
+      <p:ext uri="{BB962C8B-B14F-4D97-AF65-F5344CB8AC3E}">
+        <p14:creationId xmlns:p14="http://schemas.microsoft.com/office/powerpoint/2010/main" val="1247778244"/>
+      </p:ext>
+    </p:extLst>
+  </p:cSld>
+  <p:clrMapOvr>
+    <a:masterClrMapping/>
+  </p:clrMapOvr>
+</p:sld>
+</file>
+
+<file path=ppt/slides/slide26.xml><?xml version="1.0" encoding="utf-8"?>
+<p:sld xmlns:a="http://schemas.openxmlformats.org/drawingml/2006/main" xmlns:r="http://schemas.openxmlformats.org/officeDocument/2006/relationships" xmlns:p="http://schemas.openxmlformats.org/presentationml/2006/main">
+  <p:cSld>
+    <p:spTree>
+      <p:nvGrpSpPr>
+        <p:cNvPr id="1" name=""/>
+        <p:cNvGrpSpPr/>
+        <p:nvPr/>
+      </p:nvGrpSpPr>
+      <p:grpSpPr>
+        <a:xfrm>
+          <a:off x="0" y="0"/>
+          <a:ext cx="0" cy="0"/>
+          <a:chOff x="0" y="0"/>
+          <a:chExt cx="0" cy="0"/>
+        </a:xfrm>
+      </p:grpSpPr>
+      <p:sp>
+        <p:nvSpPr>
+          <p:cNvPr id="2" name="Title 1">
+            <a:extLst>
+              <a:ext uri="{FF2B5EF4-FFF2-40B4-BE49-F238E27FC236}">
                 <a16:creationId xmlns:a16="http://schemas.microsoft.com/office/drawing/2014/main" id="{D1748410-4738-F7E8-BF5A-E33B49CE7714}"/>
               </a:ext>
             </a:extLst>
@@ -8168,7 +8535,7 @@
 </p:sld>
 </file>
 
-<file path=ppt/slides/slide26.xml><?xml version="1.0" encoding="utf-8"?>
+<file path=ppt/slides/slide27.xml><?xml version="1.0" encoding="utf-8"?>
 <p:sld xmlns:a="http://schemas.openxmlformats.org/drawingml/2006/main" xmlns:r="http://schemas.openxmlformats.org/officeDocument/2006/relationships" xmlns:p="http://schemas.openxmlformats.org/presentationml/2006/main">
   <p:cSld>
     <p:spTree>
@@ -8340,7 +8707,7 @@
           <a:p>
             <a:r>
               <a:rPr lang="en-US" dirty="0"/>
-              <a:t>Currently work as a Group Product Manager at a small consulting firm focusing on Civic Tech</a:t>
+              <a:t>Will begin working as a Lead Product Manager at a consulting firm focusing on Civic Tech</a:t>
             </a:r>
           </a:p>
         </p:txBody>
@@ -8530,7 +8897,7 @@
             <a:pPr lvl="1"/>
             <a:r>
               <a:rPr lang="en-US" dirty="0"/>
-              <a:t>Example: If your university or department has a policy regarding GPA’s on resumes I do not know what they are</a:t>
+              <a:t>Example: If your university or department has a policy regarding GPAs on resumes, I do not know what they are</a:t>
             </a:r>
           </a:p>
           <a:p>
@@ -8972,7 +9339,7 @@
           <a:p>
             <a:r>
               <a:rPr lang="en-US" dirty="0"/>
-              <a:t>Generally a few sentences long</a:t>
+              <a:t>Generally, a few sentences long</a:t>
             </a:r>
           </a:p>
           <a:p>

</xml_diff>